<commit_message>
Where to buy EduShield added in pptx
</commit_message>
<xml_diff>
--- a/extras/learning/Arduino Workshop EduShield.pptx
+++ b/extras/learning/Arduino Workshop EduShield.pptx
@@ -5,10 +5,10 @@
     <p:sldMasterId id="2147483648" r:id="rId2"/>
   </p:sldMasterIdLst>
   <p:notesMasterIdLst>
-    <p:notesMasterId r:id="rId28"/>
+    <p:notesMasterId r:id="rId29"/>
   </p:notesMasterIdLst>
   <p:handoutMasterIdLst>
-    <p:handoutMasterId r:id="rId29"/>
+    <p:handoutMasterId r:id="rId30"/>
   </p:handoutMasterIdLst>
   <p:sldIdLst>
     <p:sldId id="256" r:id="rId3"/>
@@ -36,6 +36,7 @@
     <p:sldId id="293" r:id="rId25"/>
     <p:sldId id="297" r:id="rId26"/>
     <p:sldId id="298" r:id="rId27"/>
+    <p:sldId id="299" r:id="rId28"/>
   </p:sldIdLst>
   <p:sldSz cx="12192000" cy="6858000"/>
   <p:notesSz cx="6858000" cy="9144000"/>
@@ -235,7 +236,7 @@
           <a:p>
             <a:fld id="{27436498-F781-46EC-B523-A536DD5DC2E4}" type="datetimeFigureOut">
               <a:rPr lang="en-US" smtClean="0"/>
-              <a:t>12/10/2016</a:t>
+              <a:t>2/3/2017</a:t>
             </a:fld>
             <a:endParaRPr lang="en-US"/>
           </a:p>
@@ -400,7 +401,7 @@
           <a:p>
             <a:fld id="{5FDCBA4C-DA75-42DF-B0FA-A912DAFD6C11}" type="datetimeFigureOut">
               <a:rPr lang="en-US" smtClean="0"/>
-              <a:t>12/10/2016</a:t>
+              <a:t>2/3/2017</a:t>
             </a:fld>
             <a:endParaRPr lang="en-US"/>
           </a:p>
@@ -3361,7 +3362,7 @@
           <a:p>
             <a:fld id="{E67B6E39-B479-4EAD-9D1B-25702D54AA7D}" type="datetimeFigureOut">
               <a:rPr lang="cs-CZ" smtClean="0"/>
-              <a:t>10.12.2016</a:t>
+              <a:t>3.2.2017</a:t>
             </a:fld>
             <a:endParaRPr lang="cs-CZ"/>
           </a:p>
@@ -3531,7 +3532,7 @@
           <a:p>
             <a:fld id="{E67B6E39-B479-4EAD-9D1B-25702D54AA7D}" type="datetimeFigureOut">
               <a:rPr lang="cs-CZ" smtClean="0"/>
-              <a:t>10.12.2016</a:t>
+              <a:t>3.2.2017</a:t>
             </a:fld>
             <a:endParaRPr lang="cs-CZ"/>
           </a:p>
@@ -3711,7 +3712,7 @@
           <a:p>
             <a:fld id="{E67B6E39-B479-4EAD-9D1B-25702D54AA7D}" type="datetimeFigureOut">
               <a:rPr lang="cs-CZ" smtClean="0"/>
-              <a:t>10.12.2016</a:t>
+              <a:t>3.2.2017</a:t>
             </a:fld>
             <a:endParaRPr lang="cs-CZ"/>
           </a:p>
@@ -3881,7 +3882,7 @@
           <a:p>
             <a:fld id="{E67B6E39-B479-4EAD-9D1B-25702D54AA7D}" type="datetimeFigureOut">
               <a:rPr lang="cs-CZ" smtClean="0"/>
-              <a:t>10.12.2016</a:t>
+              <a:t>3.2.2017</a:t>
             </a:fld>
             <a:endParaRPr lang="cs-CZ"/>
           </a:p>
@@ -4127,7 +4128,7 @@
           <a:p>
             <a:fld id="{E67B6E39-B479-4EAD-9D1B-25702D54AA7D}" type="datetimeFigureOut">
               <a:rPr lang="cs-CZ" smtClean="0"/>
-              <a:t>10.12.2016</a:t>
+              <a:t>3.2.2017</a:t>
             </a:fld>
             <a:endParaRPr lang="cs-CZ"/>
           </a:p>
@@ -4359,7 +4360,7 @@
           <a:p>
             <a:fld id="{E67B6E39-B479-4EAD-9D1B-25702D54AA7D}" type="datetimeFigureOut">
               <a:rPr lang="cs-CZ" smtClean="0"/>
-              <a:t>10.12.2016</a:t>
+              <a:t>3.2.2017</a:t>
             </a:fld>
             <a:endParaRPr lang="cs-CZ"/>
           </a:p>
@@ -4726,7 +4727,7 @@
           <a:p>
             <a:fld id="{E67B6E39-B479-4EAD-9D1B-25702D54AA7D}" type="datetimeFigureOut">
               <a:rPr lang="cs-CZ" smtClean="0"/>
-              <a:t>10.12.2016</a:t>
+              <a:t>3.2.2017</a:t>
             </a:fld>
             <a:endParaRPr lang="cs-CZ"/>
           </a:p>
@@ -4844,7 +4845,7 @@
           <a:p>
             <a:fld id="{E67B6E39-B479-4EAD-9D1B-25702D54AA7D}" type="datetimeFigureOut">
               <a:rPr lang="cs-CZ" smtClean="0"/>
-              <a:t>10.12.2016</a:t>
+              <a:t>3.2.2017</a:t>
             </a:fld>
             <a:endParaRPr lang="cs-CZ"/>
           </a:p>
@@ -4939,7 +4940,7 @@
           <a:p>
             <a:fld id="{E67B6E39-B479-4EAD-9D1B-25702D54AA7D}" type="datetimeFigureOut">
               <a:rPr lang="cs-CZ" smtClean="0"/>
-              <a:t>10.12.2016</a:t>
+              <a:t>3.2.2017</a:t>
             </a:fld>
             <a:endParaRPr lang="cs-CZ"/>
           </a:p>
@@ -5216,7 +5217,7 @@
           <a:p>
             <a:fld id="{E67B6E39-B479-4EAD-9D1B-25702D54AA7D}" type="datetimeFigureOut">
               <a:rPr lang="cs-CZ" smtClean="0"/>
-              <a:t>10.12.2016</a:t>
+              <a:t>3.2.2017</a:t>
             </a:fld>
             <a:endParaRPr lang="cs-CZ"/>
           </a:p>
@@ -5469,7 +5470,7 @@
           <a:p>
             <a:fld id="{E67B6E39-B479-4EAD-9D1B-25702D54AA7D}" type="datetimeFigureOut">
               <a:rPr lang="cs-CZ" smtClean="0"/>
-              <a:t>10.12.2016</a:t>
+              <a:t>3.2.2017</a:t>
             </a:fld>
             <a:endParaRPr lang="cs-CZ"/>
           </a:p>
@@ -5682,7 +5683,7 @@
           <a:p>
             <a:fld id="{E67B6E39-B479-4EAD-9D1B-25702D54AA7D}" type="datetimeFigureOut">
               <a:rPr lang="cs-CZ" smtClean="0"/>
-              <a:t>10.12.2016</a:t>
+              <a:t>3.2.2017</a:t>
             </a:fld>
             <a:endParaRPr lang="cs-CZ"/>
           </a:p>
@@ -7755,56 +7756,56 @@
                 <a:gridCol w="735888">
                   <a:extLst>
                     <a:ext uri="{9D8B030D-6E8A-4147-A177-3AD203B41FA5}">
-                      <a16:colId xmlns:a16="http://schemas.microsoft.com/office/drawing/2014/main" val="1106726506"/>
+                      <a16:colId xmlns:a16="http://schemas.microsoft.com/office/drawing/2014/main" xmlns="" val="1106726506"/>
                     </a:ext>
                   </a:extLst>
                 </a:gridCol>
                 <a:gridCol w="735888">
                   <a:extLst>
                     <a:ext uri="{9D8B030D-6E8A-4147-A177-3AD203B41FA5}">
-                      <a16:colId xmlns:a16="http://schemas.microsoft.com/office/drawing/2014/main" val="787982742"/>
+                      <a16:colId xmlns:a16="http://schemas.microsoft.com/office/drawing/2014/main" xmlns="" val="787982742"/>
                     </a:ext>
                   </a:extLst>
                 </a:gridCol>
                 <a:gridCol w="735888">
                   <a:extLst>
                     <a:ext uri="{9D8B030D-6E8A-4147-A177-3AD203B41FA5}">
-                      <a16:colId xmlns:a16="http://schemas.microsoft.com/office/drawing/2014/main" val="3497573622"/>
+                      <a16:colId xmlns:a16="http://schemas.microsoft.com/office/drawing/2014/main" xmlns="" val="3497573622"/>
                     </a:ext>
                   </a:extLst>
                 </a:gridCol>
                 <a:gridCol w="735888">
                   <a:extLst>
                     <a:ext uri="{9D8B030D-6E8A-4147-A177-3AD203B41FA5}">
-                      <a16:colId xmlns:a16="http://schemas.microsoft.com/office/drawing/2014/main" val="1848036006"/>
+                      <a16:colId xmlns:a16="http://schemas.microsoft.com/office/drawing/2014/main" xmlns="" val="1848036006"/>
                     </a:ext>
                   </a:extLst>
                 </a:gridCol>
                 <a:gridCol w="735888">
                   <a:extLst>
                     <a:ext uri="{9D8B030D-6E8A-4147-A177-3AD203B41FA5}">
-                      <a16:colId xmlns:a16="http://schemas.microsoft.com/office/drawing/2014/main" val="4277190467"/>
+                      <a16:colId xmlns:a16="http://schemas.microsoft.com/office/drawing/2014/main" xmlns="" val="4277190467"/>
                     </a:ext>
                   </a:extLst>
                 </a:gridCol>
                 <a:gridCol w="735888">
                   <a:extLst>
                     <a:ext uri="{9D8B030D-6E8A-4147-A177-3AD203B41FA5}">
-                      <a16:colId xmlns:a16="http://schemas.microsoft.com/office/drawing/2014/main" val="3711402495"/>
+                      <a16:colId xmlns:a16="http://schemas.microsoft.com/office/drawing/2014/main" xmlns="" val="3711402495"/>
                     </a:ext>
                   </a:extLst>
                 </a:gridCol>
                 <a:gridCol w="735888">
                   <a:extLst>
                     <a:ext uri="{9D8B030D-6E8A-4147-A177-3AD203B41FA5}">
-                      <a16:colId xmlns:a16="http://schemas.microsoft.com/office/drawing/2014/main" val="3984319553"/>
+                      <a16:colId xmlns:a16="http://schemas.microsoft.com/office/drawing/2014/main" xmlns="" val="3984319553"/>
                     </a:ext>
                   </a:extLst>
                 </a:gridCol>
                 <a:gridCol w="735888">
                   <a:extLst>
                     <a:ext uri="{9D8B030D-6E8A-4147-A177-3AD203B41FA5}">
-                      <a16:colId xmlns:a16="http://schemas.microsoft.com/office/drawing/2014/main" val="1505293161"/>
+                      <a16:colId xmlns:a16="http://schemas.microsoft.com/office/drawing/2014/main" xmlns="" val="1505293161"/>
                     </a:ext>
                   </a:extLst>
                 </a:gridCol>
@@ -8284,7 +8285,7 @@
                 </a:tc>
                 <a:extLst>
                   <a:ext uri="{0D108BD9-81ED-4DB2-BD59-A6C34878D82A}">
-                    <a16:rowId xmlns:a16="http://schemas.microsoft.com/office/drawing/2014/main" val="3354321866"/>
+                    <a16:rowId xmlns:a16="http://schemas.microsoft.com/office/drawing/2014/main" xmlns="" val="3354321866"/>
                   </a:ext>
                 </a:extLst>
               </a:tr>
@@ -8733,7 +8734,7 @@
                 </a:tc>
                 <a:extLst>
                   <a:ext uri="{0D108BD9-81ED-4DB2-BD59-A6C34878D82A}">
-                    <a16:rowId xmlns:a16="http://schemas.microsoft.com/office/drawing/2014/main" val="2231251187"/>
+                    <a16:rowId xmlns:a16="http://schemas.microsoft.com/office/drawing/2014/main" xmlns="" val="2231251187"/>
                   </a:ext>
                 </a:extLst>
               </a:tr>
@@ -9170,7 +9171,7 @@
                 </a:tc>
                 <a:extLst>
                   <a:ext uri="{0D108BD9-81ED-4DB2-BD59-A6C34878D82A}">
-                    <a16:rowId xmlns:a16="http://schemas.microsoft.com/office/drawing/2014/main" val="3557488179"/>
+                    <a16:rowId xmlns:a16="http://schemas.microsoft.com/office/drawing/2014/main" xmlns="" val="3557488179"/>
                   </a:ext>
                 </a:extLst>
               </a:tr>
@@ -9616,7 +9617,7 @@
                 </a:tc>
                 <a:extLst>
                   <a:ext uri="{0D108BD9-81ED-4DB2-BD59-A6C34878D82A}">
-                    <a16:rowId xmlns:a16="http://schemas.microsoft.com/office/drawing/2014/main" val="4023099084"/>
+                    <a16:rowId xmlns:a16="http://schemas.microsoft.com/office/drawing/2014/main" xmlns="" val="4023099084"/>
                   </a:ext>
                 </a:extLst>
               </a:tr>
@@ -10062,7 +10063,7 @@
                 </a:tc>
                 <a:extLst>
                   <a:ext uri="{0D108BD9-81ED-4DB2-BD59-A6C34878D82A}">
-                    <a16:rowId xmlns:a16="http://schemas.microsoft.com/office/drawing/2014/main" val="276124161"/>
+                    <a16:rowId xmlns:a16="http://schemas.microsoft.com/office/drawing/2014/main" xmlns="" val="276124161"/>
                   </a:ext>
                 </a:extLst>
               </a:tr>
@@ -10505,7 +10506,7 @@
                 </a:tc>
                 <a:extLst>
                   <a:ext uri="{0D108BD9-81ED-4DB2-BD59-A6C34878D82A}">
-                    <a16:rowId xmlns:a16="http://schemas.microsoft.com/office/drawing/2014/main" val="2203972093"/>
+                    <a16:rowId xmlns:a16="http://schemas.microsoft.com/office/drawing/2014/main" xmlns="" val="2203972093"/>
                   </a:ext>
                 </a:extLst>
               </a:tr>
@@ -10951,7 +10952,7 @@
                 </a:tc>
                 <a:extLst>
                   <a:ext uri="{0D108BD9-81ED-4DB2-BD59-A6C34878D82A}">
-                    <a16:rowId xmlns:a16="http://schemas.microsoft.com/office/drawing/2014/main" val="2068545346"/>
+                    <a16:rowId xmlns:a16="http://schemas.microsoft.com/office/drawing/2014/main" xmlns="" val="2068545346"/>
                   </a:ext>
                 </a:extLst>
               </a:tr>
@@ -11400,7 +11401,7 @@
                 </a:tc>
                 <a:extLst>
                   <a:ext uri="{0D108BD9-81ED-4DB2-BD59-A6C34878D82A}">
-                    <a16:rowId xmlns:a16="http://schemas.microsoft.com/office/drawing/2014/main" val="371906677"/>
+                    <a16:rowId xmlns:a16="http://schemas.microsoft.com/office/drawing/2014/main" xmlns="" val="371906677"/>
                   </a:ext>
                 </a:extLst>
               </a:tr>
@@ -11840,7 +11841,7 @@
                 </a:tc>
                 <a:extLst>
                   <a:ext uri="{0D108BD9-81ED-4DB2-BD59-A6C34878D82A}">
-                    <a16:rowId xmlns:a16="http://schemas.microsoft.com/office/drawing/2014/main" val="3899741802"/>
+                    <a16:rowId xmlns:a16="http://schemas.microsoft.com/office/drawing/2014/main" xmlns="" val="3899741802"/>
                   </a:ext>
                 </a:extLst>
               </a:tr>
@@ -12292,7 +12293,7 @@
                 </a:tc>
                 <a:extLst>
                   <a:ext uri="{0D108BD9-81ED-4DB2-BD59-A6C34878D82A}">
-                    <a16:rowId xmlns:a16="http://schemas.microsoft.com/office/drawing/2014/main" val="2043351345"/>
+                    <a16:rowId xmlns:a16="http://schemas.microsoft.com/office/drawing/2014/main" xmlns="" val="2043351345"/>
                   </a:ext>
                 </a:extLst>
               </a:tr>
@@ -12741,7 +12742,7 @@
                 </a:tc>
                 <a:extLst>
                   <a:ext uri="{0D108BD9-81ED-4DB2-BD59-A6C34878D82A}">
-                    <a16:rowId xmlns:a16="http://schemas.microsoft.com/office/drawing/2014/main" val="3749023985"/>
+                    <a16:rowId xmlns:a16="http://schemas.microsoft.com/office/drawing/2014/main" xmlns="" val="3749023985"/>
                   </a:ext>
                 </a:extLst>
               </a:tr>
@@ -13190,7 +13191,7 @@
                 </a:tc>
                 <a:extLst>
                   <a:ext uri="{0D108BD9-81ED-4DB2-BD59-A6C34878D82A}">
-                    <a16:rowId xmlns:a16="http://schemas.microsoft.com/office/drawing/2014/main" val="3350007842"/>
+                    <a16:rowId xmlns:a16="http://schemas.microsoft.com/office/drawing/2014/main" xmlns="" val="3350007842"/>
                   </a:ext>
                 </a:extLst>
               </a:tr>
@@ -13636,7 +13637,7 @@
                 </a:tc>
                 <a:extLst>
                   <a:ext uri="{0D108BD9-81ED-4DB2-BD59-A6C34878D82A}">
-                    <a16:rowId xmlns:a16="http://schemas.microsoft.com/office/drawing/2014/main" val="3064817792"/>
+                    <a16:rowId xmlns:a16="http://schemas.microsoft.com/office/drawing/2014/main" xmlns="" val="3064817792"/>
                   </a:ext>
                 </a:extLst>
               </a:tr>
@@ -14079,7 +14080,7 @@
                 </a:tc>
                 <a:extLst>
                   <a:ext uri="{0D108BD9-81ED-4DB2-BD59-A6C34878D82A}">
-                    <a16:rowId xmlns:a16="http://schemas.microsoft.com/office/drawing/2014/main" val="49196926"/>
+                    <a16:rowId xmlns:a16="http://schemas.microsoft.com/office/drawing/2014/main" xmlns="" val="49196926"/>
                   </a:ext>
                 </a:extLst>
               </a:tr>
@@ -14525,7 +14526,7 @@
                 </a:tc>
                 <a:extLst>
                   <a:ext uri="{0D108BD9-81ED-4DB2-BD59-A6C34878D82A}">
-                    <a16:rowId xmlns:a16="http://schemas.microsoft.com/office/drawing/2014/main" val="3195718289"/>
+                    <a16:rowId xmlns:a16="http://schemas.microsoft.com/office/drawing/2014/main" xmlns="" val="3195718289"/>
                   </a:ext>
                 </a:extLst>
               </a:tr>
@@ -14971,7 +14972,7 @@
                 </a:tc>
                 <a:extLst>
                   <a:ext uri="{0D108BD9-81ED-4DB2-BD59-A6C34878D82A}">
-                    <a16:rowId xmlns:a16="http://schemas.microsoft.com/office/drawing/2014/main" val="3292572734"/>
+                    <a16:rowId xmlns:a16="http://schemas.microsoft.com/office/drawing/2014/main" xmlns="" val="3292572734"/>
                   </a:ext>
                 </a:extLst>
               </a:tr>
@@ -15414,7 +15415,7 @@
                 </a:tc>
                 <a:extLst>
                   <a:ext uri="{0D108BD9-81ED-4DB2-BD59-A6C34878D82A}">
-                    <a16:rowId xmlns:a16="http://schemas.microsoft.com/office/drawing/2014/main" val="902044846"/>
+                    <a16:rowId xmlns:a16="http://schemas.microsoft.com/office/drawing/2014/main" xmlns="" val="902044846"/>
                   </a:ext>
                 </a:extLst>
               </a:tr>
@@ -16051,6 +16052,528 @@
     <p:extLst>
       <p:ext uri="{BB962C8B-B14F-4D97-AF65-F5344CB8AC3E}">
         <p14:creationId xmlns:p14="http://schemas.microsoft.com/office/powerpoint/2010/main" val="2763558672"/>
+      </p:ext>
+    </p:extLst>
+  </p:cSld>
+  <p:clrMapOvr>
+    <a:masterClrMapping/>
+  </p:clrMapOvr>
+</p:sld>
+</file>
+
+<file path=ppt/slides/slide26.xml><?xml version="1.0" encoding="utf-8"?>
+<p:sld xmlns:a="http://schemas.openxmlformats.org/drawingml/2006/main" xmlns:r="http://schemas.openxmlformats.org/officeDocument/2006/relationships" xmlns:p="http://schemas.openxmlformats.org/presentationml/2006/main">
+  <p:cSld>
+    <p:spTree>
+      <p:nvGrpSpPr>
+        <p:cNvPr id="1" name=""/>
+        <p:cNvGrpSpPr/>
+        <p:nvPr/>
+      </p:nvGrpSpPr>
+      <p:grpSpPr>
+        <a:xfrm>
+          <a:off x="0" y="0"/>
+          <a:ext cx="0" cy="0"/>
+          <a:chOff x="0" y="0"/>
+          <a:chExt cx="0" cy="0"/>
+        </a:xfrm>
+      </p:grpSpPr>
+      <p:sp>
+        <p:nvSpPr>
+          <p:cNvPr id="6" name="TextShape 1"/>
+          <p:cNvSpPr txBox="1"/>
+          <p:nvPr/>
+        </p:nvSpPr>
+        <p:spPr>
+          <a:xfrm>
+            <a:off x="838440" y="365400"/>
+            <a:ext cx="10515240" cy="1325160"/>
+          </a:xfrm>
+          <a:prstGeom prst="rect">
+            <a:avLst/>
+          </a:prstGeom>
+          <a:noFill/>
+          <a:ln>
+            <a:noFill/>
+          </a:ln>
+        </p:spPr>
+        <p:txBody>
+          <a:bodyPr anchor="ctr"/>
+          <a:lstStyle/>
+          <a:p>
+            <a:pPr>
+              <a:lnSpc>
+                <a:spcPct val="90000"/>
+              </a:lnSpc>
+            </a:pPr>
+            <a:r>
+              <a:rPr lang="cs-CZ" sz="4400" spc="-1" dirty="0" smtClean="0">
+                <a:solidFill>
+                  <a:srgbClr val="000000"/>
+                </a:solidFill>
+                <a:uFill>
+                  <a:solidFill>
+                    <a:srgbClr val="FFFFFF"/>
+                  </a:solidFill>
+                </a:uFill>
+                <a:latin typeface="Calibri Light"/>
+              </a:rPr>
+              <a:t>Kde koupit </a:t>
+            </a:r>
+            <a:r>
+              <a:rPr lang="cs-CZ" sz="4400" spc="-1" dirty="0" err="1" smtClean="0">
+                <a:solidFill>
+                  <a:srgbClr val="000000"/>
+                </a:solidFill>
+                <a:uFill>
+                  <a:solidFill>
+                    <a:srgbClr val="FFFFFF"/>
+                  </a:solidFill>
+                </a:uFill>
+                <a:latin typeface="Calibri Light"/>
+              </a:rPr>
+              <a:t>EduShield</a:t>
+            </a:r>
+            <a:r>
+              <a:rPr lang="cs-CZ" sz="4400" b="0" strike="noStrike" spc="-1" dirty="0" smtClean="0">
+                <a:solidFill>
+                  <a:srgbClr val="000000"/>
+                </a:solidFill>
+                <a:uFill>
+                  <a:solidFill>
+                    <a:srgbClr val="FFFFFF"/>
+                  </a:solidFill>
+                </a:uFill>
+                <a:latin typeface="Calibri Light"/>
+              </a:rPr>
+              <a:t>?</a:t>
+            </a:r>
+            <a:endParaRPr lang="cs-CZ" sz="1800" b="0" strike="noStrike" spc="-1" dirty="0">
+              <a:solidFill>
+                <a:srgbClr val="000000"/>
+              </a:solidFill>
+              <a:uFill>
+                <a:solidFill>
+                  <a:srgbClr val="FFFFFF"/>
+                </a:solidFill>
+              </a:uFill>
+              <a:latin typeface="Calibri"/>
+            </a:endParaRPr>
+          </a:p>
+        </p:txBody>
+      </p:sp>
+      <p:sp>
+        <p:nvSpPr>
+          <p:cNvPr id="7" name="TextShape 2"/>
+          <p:cNvSpPr txBox="1"/>
+          <p:nvPr/>
+        </p:nvSpPr>
+        <p:spPr>
+          <a:xfrm>
+            <a:off x="838440" y="1825560"/>
+            <a:ext cx="10515240" cy="4350960"/>
+          </a:xfrm>
+          <a:prstGeom prst="rect">
+            <a:avLst/>
+          </a:prstGeom>
+          <a:noFill/>
+          <a:ln>
+            <a:noFill/>
+          </a:ln>
+        </p:spPr>
+        <p:txBody>
+          <a:bodyPr/>
+          <a:lstStyle/>
+          <a:p>
+            <a:pPr marL="228600" indent="-228240">
+              <a:lnSpc>
+                <a:spcPct val="90000"/>
+              </a:lnSpc>
+              <a:buClr>
+                <a:srgbClr val="000000"/>
+              </a:buClr>
+              <a:buFont typeface="Arial"/>
+              <a:buChar char="•"/>
+            </a:pPr>
+            <a:r>
+              <a:rPr lang="cs-CZ" sz="2800" b="0" strike="noStrike" spc="-1" dirty="0" err="1">
+                <a:solidFill>
+                  <a:srgbClr val="000000"/>
+                </a:solidFill>
+                <a:uFill>
+                  <a:solidFill>
+                    <a:srgbClr val="FFFFFF"/>
+                  </a:solidFill>
+                </a:uFill>
+                <a:latin typeface="Calibri"/>
+              </a:rPr>
+              <a:t>EduShieldy</a:t>
+            </a:r>
+            <a:r>
+              <a:rPr lang="cs-CZ" sz="2800" b="0" strike="noStrike" spc="-1" dirty="0">
+                <a:solidFill>
+                  <a:srgbClr val="000000"/>
+                </a:solidFill>
+                <a:uFill>
+                  <a:solidFill>
+                    <a:srgbClr val="FFFFFF"/>
+                  </a:solidFill>
+                </a:uFill>
+                <a:latin typeface="Calibri"/>
+              </a:rPr>
+              <a:t> prodává </a:t>
+            </a:r>
+            <a:r>
+              <a:rPr lang="cs-CZ" sz="2800" b="0" strike="noStrike" spc="-1" dirty="0" smtClean="0">
+                <a:solidFill>
+                  <a:srgbClr val="000000"/>
+                </a:solidFill>
+                <a:uFill>
+                  <a:solidFill>
+                    <a:srgbClr val="FFFFFF"/>
+                  </a:solidFill>
+                </a:uFill>
+                <a:latin typeface="Calibri"/>
+              </a:rPr>
+              <a:t>CZ.NIC, </a:t>
+            </a:r>
+            <a:r>
+              <a:rPr lang="cs-CZ" sz="2800" b="0" strike="noStrike" spc="-1" dirty="0" smtClean="0">
+                <a:solidFill>
+                  <a:srgbClr val="000000"/>
+                </a:solidFill>
+                <a:uFill>
+                  <a:solidFill>
+                    <a:srgbClr val="FFFFFF"/>
+                  </a:solidFill>
+                </a:uFill>
+                <a:latin typeface="Calibri"/>
+                <a:hlinkClick r:id="rId2"/>
+              </a:rPr>
+              <a:t>https://www.nic.cz</a:t>
+            </a:r>
+            <a:r>
+              <a:rPr lang="cs-CZ" sz="2800" b="0" strike="noStrike" spc="-1" dirty="0" smtClean="0">
+                <a:solidFill>
+                  <a:srgbClr val="000000"/>
+                </a:solidFill>
+                <a:uFill>
+                  <a:solidFill>
+                    <a:srgbClr val="FFFFFF"/>
+                  </a:solidFill>
+                </a:uFill>
+                <a:latin typeface="Calibri"/>
+              </a:rPr>
+              <a:t>, </a:t>
+            </a:r>
+            <a:r>
+              <a:rPr lang="cs-CZ" sz="2800" b="0" strike="noStrike" spc="-1" dirty="0" smtClean="0">
+                <a:solidFill>
+                  <a:srgbClr val="000000"/>
+                </a:solidFill>
+                <a:uFill>
+                  <a:solidFill>
+                    <a:srgbClr val="FFFFFF"/>
+                  </a:solidFill>
+                </a:uFill>
+                <a:latin typeface="Calibri"/>
+                <a:hlinkClick r:id="rId3"/>
+              </a:rPr>
+              <a:t>https://edushield.cz</a:t>
+            </a:r>
+            <a:r>
+              <a:rPr lang="cs-CZ" sz="2800" b="0" strike="noStrike" spc="-1" dirty="0" smtClean="0">
+                <a:solidFill>
+                  <a:srgbClr val="000000"/>
+                </a:solidFill>
+                <a:uFill>
+                  <a:solidFill>
+                    <a:srgbClr val="FFFFFF"/>
+                  </a:solidFill>
+                </a:uFill>
+                <a:latin typeface="Calibri"/>
+              </a:rPr>
+              <a:t> </a:t>
+            </a:r>
+            <a:endParaRPr lang="cs-CZ" sz="2800" b="0" strike="noStrike" spc="-1" dirty="0">
+              <a:solidFill>
+                <a:srgbClr val="000000"/>
+              </a:solidFill>
+              <a:uFill>
+                <a:solidFill>
+                  <a:srgbClr val="FFFFFF"/>
+                </a:solidFill>
+              </a:uFill>
+              <a:latin typeface="Calibri"/>
+            </a:endParaRPr>
+          </a:p>
+          <a:p>
+            <a:pPr marL="360">
+              <a:lnSpc>
+                <a:spcPct val="90000"/>
+              </a:lnSpc>
+              <a:buClr>
+                <a:srgbClr val="000000"/>
+              </a:buClr>
+            </a:pPr>
+            <a:endParaRPr lang="cs-CZ" sz="2800" b="0" strike="noStrike" spc="-1" dirty="0">
+              <a:solidFill>
+                <a:srgbClr val="000000"/>
+              </a:solidFill>
+              <a:uFill>
+                <a:solidFill>
+                  <a:srgbClr val="FFFFFF"/>
+                </a:solidFill>
+              </a:uFill>
+              <a:latin typeface="Calibri"/>
+            </a:endParaRPr>
+          </a:p>
+          <a:p>
+            <a:pPr marL="228600" indent="-228240">
+              <a:lnSpc>
+                <a:spcPct val="90000"/>
+              </a:lnSpc>
+              <a:buClr>
+                <a:srgbClr val="000000"/>
+              </a:buClr>
+              <a:buFont typeface="Arial"/>
+              <a:buChar char="•"/>
+            </a:pPr>
+            <a:r>
+              <a:rPr lang="cs-CZ" sz="2800" b="0" strike="noStrike" spc="-1" dirty="0">
+                <a:solidFill>
+                  <a:srgbClr val="000000"/>
+                </a:solidFill>
+                <a:uFill>
+                  <a:solidFill>
+                    <a:srgbClr val="FFFFFF"/>
+                  </a:solidFill>
+                </a:uFill>
+                <a:latin typeface="Calibri"/>
+              </a:rPr>
+              <a:t>Objednávejte na </a:t>
+            </a:r>
+            <a:r>
+              <a:rPr lang="cs-CZ" sz="2800" b="1" strike="noStrike" spc="-1" dirty="0">
+                <a:solidFill>
+                  <a:srgbClr val="000000"/>
+                </a:solidFill>
+                <a:uFill>
+                  <a:solidFill>
+                    <a:srgbClr val="FFFFFF"/>
+                  </a:solidFill>
+                </a:uFill>
+                <a:latin typeface="Calibri"/>
+                <a:hlinkClick r:id="rId4"/>
+              </a:rPr>
+              <a:t>akademie@nic.cz</a:t>
+            </a:r>
+            <a:endParaRPr lang="cs-CZ" sz="2800" b="0" strike="noStrike" spc="-1" dirty="0">
+              <a:solidFill>
+                <a:srgbClr val="000000"/>
+              </a:solidFill>
+              <a:uFill>
+                <a:solidFill>
+                  <a:srgbClr val="FFFFFF"/>
+                </a:solidFill>
+              </a:uFill>
+              <a:latin typeface="Calibri"/>
+            </a:endParaRPr>
+          </a:p>
+          <a:p>
+            <a:pPr marL="360">
+              <a:lnSpc>
+                <a:spcPct val="90000"/>
+              </a:lnSpc>
+              <a:buClr>
+                <a:srgbClr val="000000"/>
+              </a:buClr>
+            </a:pPr>
+            <a:r>
+              <a:rPr lang="cs-CZ" sz="2800" b="0" strike="noStrike" spc="-1" dirty="0">
+                <a:solidFill>
+                  <a:srgbClr val="000000"/>
+                </a:solidFill>
+                <a:uFill>
+                  <a:solidFill>
+                    <a:srgbClr val="FFFFFF"/>
+                  </a:solidFill>
+                </a:uFill>
+                <a:latin typeface="Calibri"/>
+              </a:rPr>
+              <a:t> </a:t>
+            </a:r>
+          </a:p>
+          <a:p>
+            <a:pPr marL="228600" indent="-228240">
+              <a:lnSpc>
+                <a:spcPct val="90000"/>
+              </a:lnSpc>
+              <a:buClr>
+                <a:srgbClr val="000000"/>
+              </a:buClr>
+              <a:buFont typeface="Arial"/>
+              <a:buChar char="•"/>
+            </a:pPr>
+            <a:r>
+              <a:rPr lang="cs-CZ" sz="2800" b="0" strike="noStrike" spc="-1" dirty="0">
+                <a:solidFill>
+                  <a:srgbClr val="000000"/>
+                </a:solidFill>
+                <a:uFill>
+                  <a:solidFill>
+                    <a:srgbClr val="FFFFFF"/>
+                  </a:solidFill>
+                </a:uFill>
+                <a:latin typeface="Calibri"/>
+              </a:rPr>
+              <a:t>Cena pro školy a další vzdělávací instituce / </a:t>
+            </a:r>
+            <a:r>
+              <a:rPr lang="cs-CZ" sz="2800" b="0" strike="noStrike" spc="-1" dirty="0" smtClean="0">
+                <a:solidFill>
+                  <a:srgbClr val="000000"/>
+                </a:solidFill>
+                <a:uFill>
+                  <a:solidFill>
+                    <a:srgbClr val="FFFFFF"/>
+                  </a:solidFill>
+                </a:uFill>
+                <a:latin typeface="Calibri"/>
+              </a:rPr>
+              <a:t>pracovníky:</a:t>
+            </a:r>
+            <a:br>
+              <a:rPr lang="cs-CZ" sz="2800" b="0" strike="noStrike" spc="-1" dirty="0" smtClean="0">
+                <a:solidFill>
+                  <a:srgbClr val="000000"/>
+                </a:solidFill>
+                <a:uFill>
+                  <a:solidFill>
+                    <a:srgbClr val="FFFFFF"/>
+                  </a:solidFill>
+                </a:uFill>
+                <a:latin typeface="Calibri"/>
+              </a:rPr>
+            </a:br>
+            <a:r>
+              <a:rPr lang="cs-CZ" sz="2800" b="1" strike="noStrike" spc="-1" dirty="0" smtClean="0">
+                <a:solidFill>
+                  <a:srgbClr val="000000"/>
+                </a:solidFill>
+                <a:uFill>
+                  <a:solidFill>
+                    <a:srgbClr val="FFFFFF"/>
+                  </a:solidFill>
+                </a:uFill>
+                <a:latin typeface="Calibri"/>
+              </a:rPr>
+              <a:t>250 </a:t>
+            </a:r>
+            <a:r>
+              <a:rPr lang="cs-CZ" sz="2800" b="1" strike="noStrike" spc="-1" dirty="0">
+                <a:solidFill>
+                  <a:srgbClr val="000000"/>
+                </a:solidFill>
+                <a:uFill>
+                  <a:solidFill>
+                    <a:srgbClr val="FFFFFF"/>
+                  </a:solidFill>
+                </a:uFill>
+                <a:latin typeface="Calibri"/>
+              </a:rPr>
+              <a:t>Kč / ks + DPH + poštovné a balné (99 Kč)</a:t>
+            </a:r>
+            <a:endParaRPr lang="cs-CZ" sz="2800" b="0" strike="noStrike" spc="-1" dirty="0">
+              <a:solidFill>
+                <a:srgbClr val="000000"/>
+              </a:solidFill>
+              <a:uFill>
+                <a:solidFill>
+                  <a:srgbClr val="FFFFFF"/>
+                </a:solidFill>
+              </a:uFill>
+              <a:latin typeface="Calibri"/>
+            </a:endParaRPr>
+          </a:p>
+          <a:p>
+            <a:pPr marL="360">
+              <a:lnSpc>
+                <a:spcPct val="90000"/>
+              </a:lnSpc>
+              <a:buClr>
+                <a:srgbClr val="000000"/>
+              </a:buClr>
+            </a:pPr>
+            <a:endParaRPr lang="cs-CZ" sz="2800" b="0" strike="noStrike" spc="-1" dirty="0">
+              <a:solidFill>
+                <a:srgbClr val="000000"/>
+              </a:solidFill>
+              <a:uFill>
+                <a:solidFill>
+                  <a:srgbClr val="FFFFFF"/>
+                </a:solidFill>
+              </a:uFill>
+              <a:latin typeface="Calibri"/>
+            </a:endParaRPr>
+          </a:p>
+          <a:p>
+            <a:pPr marL="228600" indent="-228240">
+              <a:lnSpc>
+                <a:spcPct val="90000"/>
+              </a:lnSpc>
+              <a:buClr>
+                <a:srgbClr val="000000"/>
+              </a:buClr>
+              <a:buFont typeface="Arial"/>
+              <a:buChar char="•"/>
+            </a:pPr>
+            <a:r>
+              <a:rPr lang="cs-CZ" sz="2800" b="0" strike="noStrike" spc="-1" dirty="0">
+                <a:solidFill>
+                  <a:srgbClr val="000000"/>
+                </a:solidFill>
+                <a:uFill>
+                  <a:solidFill>
+                    <a:srgbClr val="FFFFFF"/>
+                  </a:solidFill>
+                </a:uFill>
+                <a:latin typeface="Calibri"/>
+              </a:rPr>
+              <a:t>Komerční prodej v </a:t>
+            </a:r>
+            <a:r>
+              <a:rPr lang="cs-CZ" sz="2800" b="0" strike="noStrike" spc="-1" dirty="0" smtClean="0">
+                <a:solidFill>
+                  <a:srgbClr val="000000"/>
+                </a:solidFill>
+                <a:uFill>
+                  <a:solidFill>
+                    <a:srgbClr val="FFFFFF"/>
+                  </a:solidFill>
+                </a:uFill>
+                <a:latin typeface="Calibri"/>
+              </a:rPr>
+              <a:t>přípravě</a:t>
+            </a:r>
+            <a:endParaRPr lang="cs-CZ" sz="2800" b="0" strike="noStrike" spc="-1" dirty="0">
+              <a:solidFill>
+                <a:srgbClr val="000000"/>
+              </a:solidFill>
+              <a:uFill>
+                <a:solidFill>
+                  <a:srgbClr val="FFFFFF"/>
+                </a:solidFill>
+              </a:uFill>
+              <a:latin typeface="Calibri"/>
+            </a:endParaRPr>
+          </a:p>
+        </p:txBody>
+      </p:sp>
+    </p:spTree>
+    <p:extLst>
+      <p:ext uri="{BB962C8B-B14F-4D97-AF65-F5344CB8AC3E}">
+        <p14:creationId xmlns:p14="http://schemas.microsoft.com/office/powerpoint/2010/main" val="341151157"/>
       </p:ext>
     </p:extLst>
   </p:cSld>

</xml_diff>

<commit_message>
Deleted slide with old price of shield prototype
</commit_message>
<xml_diff>
--- a/extras/learning/Arduino Workshop EduShield.pptx
+++ b/extras/learning/Arduino Workshop EduShield.pptx
@@ -5,10 +5,10 @@
     <p:sldMasterId id="2147483648" r:id="rId2"/>
   </p:sldMasterIdLst>
   <p:notesMasterIdLst>
-    <p:notesMasterId r:id="rId29"/>
+    <p:notesMasterId r:id="rId28"/>
   </p:notesMasterIdLst>
   <p:handoutMasterIdLst>
-    <p:handoutMasterId r:id="rId30"/>
+    <p:handoutMasterId r:id="rId29"/>
   </p:handoutMasterIdLst>
   <p:sldIdLst>
     <p:sldId id="256" r:id="rId3"/>
@@ -36,7 +36,6 @@
     <p:sldId id="293" r:id="rId25"/>
     <p:sldId id="297" r:id="rId26"/>
     <p:sldId id="298" r:id="rId27"/>
-    <p:sldId id="299" r:id="rId28"/>
   </p:sldIdLst>
   <p:sldSz cx="12192000" cy="6858000"/>
   <p:notesSz cx="6858000" cy="9144000"/>
@@ -236,7 +235,7 @@
           <a:p>
             <a:fld id="{27436498-F781-46EC-B523-A536DD5DC2E4}" type="datetimeFigureOut">
               <a:rPr lang="en-US" smtClean="0"/>
-              <a:t>2/3/2017</a:t>
+              <a:t>11/8/2018</a:t>
             </a:fld>
             <a:endParaRPr lang="en-US"/>
           </a:p>
@@ -401,7 +400,7 @@
           <a:p>
             <a:fld id="{5FDCBA4C-DA75-42DF-B0FA-A912DAFD6C11}" type="datetimeFigureOut">
               <a:rPr lang="en-US" smtClean="0"/>
-              <a:t>2/3/2017</a:t>
+              <a:t>11/8/2018</a:t>
             </a:fld>
             <a:endParaRPr lang="en-US"/>
           </a:p>
@@ -3362,7 +3361,7 @@
           <a:p>
             <a:fld id="{E67B6E39-B479-4EAD-9D1B-25702D54AA7D}" type="datetimeFigureOut">
               <a:rPr lang="cs-CZ" smtClean="0"/>
-              <a:t>3.2.2017</a:t>
+              <a:t>08.11.2018</a:t>
             </a:fld>
             <a:endParaRPr lang="cs-CZ"/>
           </a:p>
@@ -3532,7 +3531,7 @@
           <a:p>
             <a:fld id="{E67B6E39-B479-4EAD-9D1B-25702D54AA7D}" type="datetimeFigureOut">
               <a:rPr lang="cs-CZ" smtClean="0"/>
-              <a:t>3.2.2017</a:t>
+              <a:t>08.11.2018</a:t>
             </a:fld>
             <a:endParaRPr lang="cs-CZ"/>
           </a:p>
@@ -3712,7 +3711,7 @@
           <a:p>
             <a:fld id="{E67B6E39-B479-4EAD-9D1B-25702D54AA7D}" type="datetimeFigureOut">
               <a:rPr lang="cs-CZ" smtClean="0"/>
-              <a:t>3.2.2017</a:t>
+              <a:t>08.11.2018</a:t>
             </a:fld>
             <a:endParaRPr lang="cs-CZ"/>
           </a:p>
@@ -3882,7 +3881,7 @@
           <a:p>
             <a:fld id="{E67B6E39-B479-4EAD-9D1B-25702D54AA7D}" type="datetimeFigureOut">
               <a:rPr lang="cs-CZ" smtClean="0"/>
-              <a:t>3.2.2017</a:t>
+              <a:t>08.11.2018</a:t>
             </a:fld>
             <a:endParaRPr lang="cs-CZ"/>
           </a:p>
@@ -4128,7 +4127,7 @@
           <a:p>
             <a:fld id="{E67B6E39-B479-4EAD-9D1B-25702D54AA7D}" type="datetimeFigureOut">
               <a:rPr lang="cs-CZ" smtClean="0"/>
-              <a:t>3.2.2017</a:t>
+              <a:t>08.11.2018</a:t>
             </a:fld>
             <a:endParaRPr lang="cs-CZ"/>
           </a:p>
@@ -4360,7 +4359,7 @@
           <a:p>
             <a:fld id="{E67B6E39-B479-4EAD-9D1B-25702D54AA7D}" type="datetimeFigureOut">
               <a:rPr lang="cs-CZ" smtClean="0"/>
-              <a:t>3.2.2017</a:t>
+              <a:t>08.11.2018</a:t>
             </a:fld>
             <a:endParaRPr lang="cs-CZ"/>
           </a:p>
@@ -4727,7 +4726,7 @@
           <a:p>
             <a:fld id="{E67B6E39-B479-4EAD-9D1B-25702D54AA7D}" type="datetimeFigureOut">
               <a:rPr lang="cs-CZ" smtClean="0"/>
-              <a:t>3.2.2017</a:t>
+              <a:t>08.11.2018</a:t>
             </a:fld>
             <a:endParaRPr lang="cs-CZ"/>
           </a:p>
@@ -4845,7 +4844,7 @@
           <a:p>
             <a:fld id="{E67B6E39-B479-4EAD-9D1B-25702D54AA7D}" type="datetimeFigureOut">
               <a:rPr lang="cs-CZ" smtClean="0"/>
-              <a:t>3.2.2017</a:t>
+              <a:t>08.11.2018</a:t>
             </a:fld>
             <a:endParaRPr lang="cs-CZ"/>
           </a:p>
@@ -4940,7 +4939,7 @@
           <a:p>
             <a:fld id="{E67B6E39-B479-4EAD-9D1B-25702D54AA7D}" type="datetimeFigureOut">
               <a:rPr lang="cs-CZ" smtClean="0"/>
-              <a:t>3.2.2017</a:t>
+              <a:t>08.11.2018</a:t>
             </a:fld>
             <a:endParaRPr lang="cs-CZ"/>
           </a:p>
@@ -5217,7 +5216,7 @@
           <a:p>
             <a:fld id="{E67B6E39-B479-4EAD-9D1B-25702D54AA7D}" type="datetimeFigureOut">
               <a:rPr lang="cs-CZ" smtClean="0"/>
-              <a:t>3.2.2017</a:t>
+              <a:t>08.11.2018</a:t>
             </a:fld>
             <a:endParaRPr lang="cs-CZ"/>
           </a:p>
@@ -5470,7 +5469,7 @@
           <a:p>
             <a:fld id="{E67B6E39-B479-4EAD-9D1B-25702D54AA7D}" type="datetimeFigureOut">
               <a:rPr lang="cs-CZ" smtClean="0"/>
-              <a:t>3.2.2017</a:t>
+              <a:t>08.11.2018</a:t>
             </a:fld>
             <a:endParaRPr lang="cs-CZ"/>
           </a:p>
@@ -5683,7 +5682,7 @@
           <a:p>
             <a:fld id="{E67B6E39-B479-4EAD-9D1B-25702D54AA7D}" type="datetimeFigureOut">
               <a:rPr lang="cs-CZ" smtClean="0"/>
-              <a:t>3.2.2017</a:t>
+              <a:t>08.11.2018</a:t>
             </a:fld>
             <a:endParaRPr lang="cs-CZ"/>
           </a:p>
@@ -7756,56 +7755,56 @@
                 <a:gridCol w="735888">
                   <a:extLst>
                     <a:ext uri="{9D8B030D-6E8A-4147-A177-3AD203B41FA5}">
-                      <a16:colId xmlns:a16="http://schemas.microsoft.com/office/drawing/2014/main" xmlns="" val="1106726506"/>
+                      <a16:colId xmlns:a16="http://schemas.microsoft.com/office/drawing/2014/main" val="1106726506"/>
                     </a:ext>
                   </a:extLst>
                 </a:gridCol>
                 <a:gridCol w="735888">
                   <a:extLst>
                     <a:ext uri="{9D8B030D-6E8A-4147-A177-3AD203B41FA5}">
-                      <a16:colId xmlns:a16="http://schemas.microsoft.com/office/drawing/2014/main" xmlns="" val="787982742"/>
+                      <a16:colId xmlns:a16="http://schemas.microsoft.com/office/drawing/2014/main" val="787982742"/>
                     </a:ext>
                   </a:extLst>
                 </a:gridCol>
                 <a:gridCol w="735888">
                   <a:extLst>
                     <a:ext uri="{9D8B030D-6E8A-4147-A177-3AD203B41FA5}">
-                      <a16:colId xmlns:a16="http://schemas.microsoft.com/office/drawing/2014/main" xmlns="" val="3497573622"/>
+                      <a16:colId xmlns:a16="http://schemas.microsoft.com/office/drawing/2014/main" val="3497573622"/>
                     </a:ext>
                   </a:extLst>
                 </a:gridCol>
                 <a:gridCol w="735888">
                   <a:extLst>
                     <a:ext uri="{9D8B030D-6E8A-4147-A177-3AD203B41FA5}">
-                      <a16:colId xmlns:a16="http://schemas.microsoft.com/office/drawing/2014/main" xmlns="" val="1848036006"/>
+                      <a16:colId xmlns:a16="http://schemas.microsoft.com/office/drawing/2014/main" val="1848036006"/>
                     </a:ext>
                   </a:extLst>
                 </a:gridCol>
                 <a:gridCol w="735888">
                   <a:extLst>
                     <a:ext uri="{9D8B030D-6E8A-4147-A177-3AD203B41FA5}">
-                      <a16:colId xmlns:a16="http://schemas.microsoft.com/office/drawing/2014/main" xmlns="" val="4277190467"/>
+                      <a16:colId xmlns:a16="http://schemas.microsoft.com/office/drawing/2014/main" val="4277190467"/>
                     </a:ext>
                   </a:extLst>
                 </a:gridCol>
                 <a:gridCol w="735888">
                   <a:extLst>
                     <a:ext uri="{9D8B030D-6E8A-4147-A177-3AD203B41FA5}">
-                      <a16:colId xmlns:a16="http://schemas.microsoft.com/office/drawing/2014/main" xmlns="" val="3711402495"/>
+                      <a16:colId xmlns:a16="http://schemas.microsoft.com/office/drawing/2014/main" val="3711402495"/>
                     </a:ext>
                   </a:extLst>
                 </a:gridCol>
                 <a:gridCol w="735888">
                   <a:extLst>
                     <a:ext uri="{9D8B030D-6E8A-4147-A177-3AD203B41FA5}">
-                      <a16:colId xmlns:a16="http://schemas.microsoft.com/office/drawing/2014/main" xmlns="" val="3984319553"/>
+                      <a16:colId xmlns:a16="http://schemas.microsoft.com/office/drawing/2014/main" val="3984319553"/>
                     </a:ext>
                   </a:extLst>
                 </a:gridCol>
                 <a:gridCol w="735888">
                   <a:extLst>
                     <a:ext uri="{9D8B030D-6E8A-4147-A177-3AD203B41FA5}">
-                      <a16:colId xmlns:a16="http://schemas.microsoft.com/office/drawing/2014/main" xmlns="" val="1505293161"/>
+                      <a16:colId xmlns:a16="http://schemas.microsoft.com/office/drawing/2014/main" val="1505293161"/>
                     </a:ext>
                   </a:extLst>
                 </a:gridCol>
@@ -8285,7 +8284,7 @@
                 </a:tc>
                 <a:extLst>
                   <a:ext uri="{0D108BD9-81ED-4DB2-BD59-A6C34878D82A}">
-                    <a16:rowId xmlns:a16="http://schemas.microsoft.com/office/drawing/2014/main" xmlns="" val="3354321866"/>
+                    <a16:rowId xmlns:a16="http://schemas.microsoft.com/office/drawing/2014/main" val="3354321866"/>
                   </a:ext>
                 </a:extLst>
               </a:tr>
@@ -8734,7 +8733,7 @@
                 </a:tc>
                 <a:extLst>
                   <a:ext uri="{0D108BD9-81ED-4DB2-BD59-A6C34878D82A}">
-                    <a16:rowId xmlns:a16="http://schemas.microsoft.com/office/drawing/2014/main" xmlns="" val="2231251187"/>
+                    <a16:rowId xmlns:a16="http://schemas.microsoft.com/office/drawing/2014/main" val="2231251187"/>
                   </a:ext>
                 </a:extLst>
               </a:tr>
@@ -9171,7 +9170,7 @@
                 </a:tc>
                 <a:extLst>
                   <a:ext uri="{0D108BD9-81ED-4DB2-BD59-A6C34878D82A}">
-                    <a16:rowId xmlns:a16="http://schemas.microsoft.com/office/drawing/2014/main" xmlns="" val="3557488179"/>
+                    <a16:rowId xmlns:a16="http://schemas.microsoft.com/office/drawing/2014/main" val="3557488179"/>
                   </a:ext>
                 </a:extLst>
               </a:tr>
@@ -9617,7 +9616,7 @@
                 </a:tc>
                 <a:extLst>
                   <a:ext uri="{0D108BD9-81ED-4DB2-BD59-A6C34878D82A}">
-                    <a16:rowId xmlns:a16="http://schemas.microsoft.com/office/drawing/2014/main" xmlns="" val="4023099084"/>
+                    <a16:rowId xmlns:a16="http://schemas.microsoft.com/office/drawing/2014/main" val="4023099084"/>
                   </a:ext>
                 </a:extLst>
               </a:tr>
@@ -10063,7 +10062,7 @@
                 </a:tc>
                 <a:extLst>
                   <a:ext uri="{0D108BD9-81ED-4DB2-BD59-A6C34878D82A}">
-                    <a16:rowId xmlns:a16="http://schemas.microsoft.com/office/drawing/2014/main" xmlns="" val="276124161"/>
+                    <a16:rowId xmlns:a16="http://schemas.microsoft.com/office/drawing/2014/main" val="276124161"/>
                   </a:ext>
                 </a:extLst>
               </a:tr>
@@ -10506,7 +10505,7 @@
                 </a:tc>
                 <a:extLst>
                   <a:ext uri="{0D108BD9-81ED-4DB2-BD59-A6C34878D82A}">
-                    <a16:rowId xmlns:a16="http://schemas.microsoft.com/office/drawing/2014/main" xmlns="" val="2203972093"/>
+                    <a16:rowId xmlns:a16="http://schemas.microsoft.com/office/drawing/2014/main" val="2203972093"/>
                   </a:ext>
                 </a:extLst>
               </a:tr>
@@ -10952,7 +10951,7 @@
                 </a:tc>
                 <a:extLst>
                   <a:ext uri="{0D108BD9-81ED-4DB2-BD59-A6C34878D82A}">
-                    <a16:rowId xmlns:a16="http://schemas.microsoft.com/office/drawing/2014/main" xmlns="" val="2068545346"/>
+                    <a16:rowId xmlns:a16="http://schemas.microsoft.com/office/drawing/2014/main" val="2068545346"/>
                   </a:ext>
                 </a:extLst>
               </a:tr>
@@ -11401,7 +11400,7 @@
                 </a:tc>
                 <a:extLst>
                   <a:ext uri="{0D108BD9-81ED-4DB2-BD59-A6C34878D82A}">
-                    <a16:rowId xmlns:a16="http://schemas.microsoft.com/office/drawing/2014/main" xmlns="" val="371906677"/>
+                    <a16:rowId xmlns:a16="http://schemas.microsoft.com/office/drawing/2014/main" val="371906677"/>
                   </a:ext>
                 </a:extLst>
               </a:tr>
@@ -11841,7 +11840,7 @@
                 </a:tc>
                 <a:extLst>
                   <a:ext uri="{0D108BD9-81ED-4DB2-BD59-A6C34878D82A}">
-                    <a16:rowId xmlns:a16="http://schemas.microsoft.com/office/drawing/2014/main" xmlns="" val="3899741802"/>
+                    <a16:rowId xmlns:a16="http://schemas.microsoft.com/office/drawing/2014/main" val="3899741802"/>
                   </a:ext>
                 </a:extLst>
               </a:tr>
@@ -12293,7 +12292,7 @@
                 </a:tc>
                 <a:extLst>
                   <a:ext uri="{0D108BD9-81ED-4DB2-BD59-A6C34878D82A}">
-                    <a16:rowId xmlns:a16="http://schemas.microsoft.com/office/drawing/2014/main" xmlns="" val="2043351345"/>
+                    <a16:rowId xmlns:a16="http://schemas.microsoft.com/office/drawing/2014/main" val="2043351345"/>
                   </a:ext>
                 </a:extLst>
               </a:tr>
@@ -12742,7 +12741,7 @@
                 </a:tc>
                 <a:extLst>
                   <a:ext uri="{0D108BD9-81ED-4DB2-BD59-A6C34878D82A}">
-                    <a16:rowId xmlns:a16="http://schemas.microsoft.com/office/drawing/2014/main" xmlns="" val="3749023985"/>
+                    <a16:rowId xmlns:a16="http://schemas.microsoft.com/office/drawing/2014/main" val="3749023985"/>
                   </a:ext>
                 </a:extLst>
               </a:tr>
@@ -13191,7 +13190,7 @@
                 </a:tc>
                 <a:extLst>
                   <a:ext uri="{0D108BD9-81ED-4DB2-BD59-A6C34878D82A}">
-                    <a16:rowId xmlns:a16="http://schemas.microsoft.com/office/drawing/2014/main" xmlns="" val="3350007842"/>
+                    <a16:rowId xmlns:a16="http://schemas.microsoft.com/office/drawing/2014/main" val="3350007842"/>
                   </a:ext>
                 </a:extLst>
               </a:tr>
@@ -13637,7 +13636,7 @@
                 </a:tc>
                 <a:extLst>
                   <a:ext uri="{0D108BD9-81ED-4DB2-BD59-A6C34878D82A}">
-                    <a16:rowId xmlns:a16="http://schemas.microsoft.com/office/drawing/2014/main" xmlns="" val="3064817792"/>
+                    <a16:rowId xmlns:a16="http://schemas.microsoft.com/office/drawing/2014/main" val="3064817792"/>
                   </a:ext>
                 </a:extLst>
               </a:tr>
@@ -14080,7 +14079,7 @@
                 </a:tc>
                 <a:extLst>
                   <a:ext uri="{0D108BD9-81ED-4DB2-BD59-A6C34878D82A}">
-                    <a16:rowId xmlns:a16="http://schemas.microsoft.com/office/drawing/2014/main" xmlns="" val="49196926"/>
+                    <a16:rowId xmlns:a16="http://schemas.microsoft.com/office/drawing/2014/main" val="49196926"/>
                   </a:ext>
                 </a:extLst>
               </a:tr>
@@ -14526,7 +14525,7 @@
                 </a:tc>
                 <a:extLst>
                   <a:ext uri="{0D108BD9-81ED-4DB2-BD59-A6C34878D82A}">
-                    <a16:rowId xmlns:a16="http://schemas.microsoft.com/office/drawing/2014/main" xmlns="" val="3195718289"/>
+                    <a16:rowId xmlns:a16="http://schemas.microsoft.com/office/drawing/2014/main" val="3195718289"/>
                   </a:ext>
                 </a:extLst>
               </a:tr>
@@ -14972,7 +14971,7 @@
                 </a:tc>
                 <a:extLst>
                   <a:ext uri="{0D108BD9-81ED-4DB2-BD59-A6C34878D82A}">
-                    <a16:rowId xmlns:a16="http://schemas.microsoft.com/office/drawing/2014/main" xmlns="" val="3292572734"/>
+                    <a16:rowId xmlns:a16="http://schemas.microsoft.com/office/drawing/2014/main" val="3292572734"/>
                   </a:ext>
                 </a:extLst>
               </a:tr>
@@ -15415,7 +15414,7 @@
                 </a:tc>
                 <a:extLst>
                   <a:ext uri="{0D108BD9-81ED-4DB2-BD59-A6C34878D82A}">
-                    <a16:rowId xmlns:a16="http://schemas.microsoft.com/office/drawing/2014/main" xmlns="" val="902044846"/>
+                    <a16:rowId xmlns:a16="http://schemas.microsoft.com/office/drawing/2014/main" val="902044846"/>
                   </a:ext>
                 </a:extLst>
               </a:tr>
@@ -16052,528 +16051,6 @@
     <p:extLst>
       <p:ext uri="{BB962C8B-B14F-4D97-AF65-F5344CB8AC3E}">
         <p14:creationId xmlns:p14="http://schemas.microsoft.com/office/powerpoint/2010/main" val="2763558672"/>
-      </p:ext>
-    </p:extLst>
-  </p:cSld>
-  <p:clrMapOvr>
-    <a:masterClrMapping/>
-  </p:clrMapOvr>
-</p:sld>
-</file>
-
-<file path=ppt/slides/slide26.xml><?xml version="1.0" encoding="utf-8"?>
-<p:sld xmlns:a="http://schemas.openxmlformats.org/drawingml/2006/main" xmlns:r="http://schemas.openxmlformats.org/officeDocument/2006/relationships" xmlns:p="http://schemas.openxmlformats.org/presentationml/2006/main">
-  <p:cSld>
-    <p:spTree>
-      <p:nvGrpSpPr>
-        <p:cNvPr id="1" name=""/>
-        <p:cNvGrpSpPr/>
-        <p:nvPr/>
-      </p:nvGrpSpPr>
-      <p:grpSpPr>
-        <a:xfrm>
-          <a:off x="0" y="0"/>
-          <a:ext cx="0" cy="0"/>
-          <a:chOff x="0" y="0"/>
-          <a:chExt cx="0" cy="0"/>
-        </a:xfrm>
-      </p:grpSpPr>
-      <p:sp>
-        <p:nvSpPr>
-          <p:cNvPr id="6" name="TextShape 1"/>
-          <p:cNvSpPr txBox="1"/>
-          <p:nvPr/>
-        </p:nvSpPr>
-        <p:spPr>
-          <a:xfrm>
-            <a:off x="838440" y="365400"/>
-            <a:ext cx="10515240" cy="1325160"/>
-          </a:xfrm>
-          <a:prstGeom prst="rect">
-            <a:avLst/>
-          </a:prstGeom>
-          <a:noFill/>
-          <a:ln>
-            <a:noFill/>
-          </a:ln>
-        </p:spPr>
-        <p:txBody>
-          <a:bodyPr anchor="ctr"/>
-          <a:lstStyle/>
-          <a:p>
-            <a:pPr>
-              <a:lnSpc>
-                <a:spcPct val="90000"/>
-              </a:lnSpc>
-            </a:pPr>
-            <a:r>
-              <a:rPr lang="cs-CZ" sz="4400" spc="-1" dirty="0" smtClean="0">
-                <a:solidFill>
-                  <a:srgbClr val="000000"/>
-                </a:solidFill>
-                <a:uFill>
-                  <a:solidFill>
-                    <a:srgbClr val="FFFFFF"/>
-                  </a:solidFill>
-                </a:uFill>
-                <a:latin typeface="Calibri Light"/>
-              </a:rPr>
-              <a:t>Kde koupit </a:t>
-            </a:r>
-            <a:r>
-              <a:rPr lang="cs-CZ" sz="4400" spc="-1" dirty="0" err="1" smtClean="0">
-                <a:solidFill>
-                  <a:srgbClr val="000000"/>
-                </a:solidFill>
-                <a:uFill>
-                  <a:solidFill>
-                    <a:srgbClr val="FFFFFF"/>
-                  </a:solidFill>
-                </a:uFill>
-                <a:latin typeface="Calibri Light"/>
-              </a:rPr>
-              <a:t>EduShield</a:t>
-            </a:r>
-            <a:r>
-              <a:rPr lang="cs-CZ" sz="4400" b="0" strike="noStrike" spc="-1" dirty="0" smtClean="0">
-                <a:solidFill>
-                  <a:srgbClr val="000000"/>
-                </a:solidFill>
-                <a:uFill>
-                  <a:solidFill>
-                    <a:srgbClr val="FFFFFF"/>
-                  </a:solidFill>
-                </a:uFill>
-                <a:latin typeface="Calibri Light"/>
-              </a:rPr>
-              <a:t>?</a:t>
-            </a:r>
-            <a:endParaRPr lang="cs-CZ" sz="1800" b="0" strike="noStrike" spc="-1" dirty="0">
-              <a:solidFill>
-                <a:srgbClr val="000000"/>
-              </a:solidFill>
-              <a:uFill>
-                <a:solidFill>
-                  <a:srgbClr val="FFFFFF"/>
-                </a:solidFill>
-              </a:uFill>
-              <a:latin typeface="Calibri"/>
-            </a:endParaRPr>
-          </a:p>
-        </p:txBody>
-      </p:sp>
-      <p:sp>
-        <p:nvSpPr>
-          <p:cNvPr id="7" name="TextShape 2"/>
-          <p:cNvSpPr txBox="1"/>
-          <p:nvPr/>
-        </p:nvSpPr>
-        <p:spPr>
-          <a:xfrm>
-            <a:off x="838440" y="1825560"/>
-            <a:ext cx="10515240" cy="4350960"/>
-          </a:xfrm>
-          <a:prstGeom prst="rect">
-            <a:avLst/>
-          </a:prstGeom>
-          <a:noFill/>
-          <a:ln>
-            <a:noFill/>
-          </a:ln>
-        </p:spPr>
-        <p:txBody>
-          <a:bodyPr/>
-          <a:lstStyle/>
-          <a:p>
-            <a:pPr marL="228600" indent="-228240">
-              <a:lnSpc>
-                <a:spcPct val="90000"/>
-              </a:lnSpc>
-              <a:buClr>
-                <a:srgbClr val="000000"/>
-              </a:buClr>
-              <a:buFont typeface="Arial"/>
-              <a:buChar char="•"/>
-            </a:pPr>
-            <a:r>
-              <a:rPr lang="cs-CZ" sz="2800" b="0" strike="noStrike" spc="-1" dirty="0" err="1">
-                <a:solidFill>
-                  <a:srgbClr val="000000"/>
-                </a:solidFill>
-                <a:uFill>
-                  <a:solidFill>
-                    <a:srgbClr val="FFFFFF"/>
-                  </a:solidFill>
-                </a:uFill>
-                <a:latin typeface="Calibri"/>
-              </a:rPr>
-              <a:t>EduShieldy</a:t>
-            </a:r>
-            <a:r>
-              <a:rPr lang="cs-CZ" sz="2800" b="0" strike="noStrike" spc="-1" dirty="0">
-                <a:solidFill>
-                  <a:srgbClr val="000000"/>
-                </a:solidFill>
-                <a:uFill>
-                  <a:solidFill>
-                    <a:srgbClr val="FFFFFF"/>
-                  </a:solidFill>
-                </a:uFill>
-                <a:latin typeface="Calibri"/>
-              </a:rPr>
-              <a:t> prodává </a:t>
-            </a:r>
-            <a:r>
-              <a:rPr lang="cs-CZ" sz="2800" b="0" strike="noStrike" spc="-1" dirty="0" smtClean="0">
-                <a:solidFill>
-                  <a:srgbClr val="000000"/>
-                </a:solidFill>
-                <a:uFill>
-                  <a:solidFill>
-                    <a:srgbClr val="FFFFFF"/>
-                  </a:solidFill>
-                </a:uFill>
-                <a:latin typeface="Calibri"/>
-              </a:rPr>
-              <a:t>CZ.NIC, </a:t>
-            </a:r>
-            <a:r>
-              <a:rPr lang="cs-CZ" sz="2800" b="0" strike="noStrike" spc="-1" dirty="0" smtClean="0">
-                <a:solidFill>
-                  <a:srgbClr val="000000"/>
-                </a:solidFill>
-                <a:uFill>
-                  <a:solidFill>
-                    <a:srgbClr val="FFFFFF"/>
-                  </a:solidFill>
-                </a:uFill>
-                <a:latin typeface="Calibri"/>
-                <a:hlinkClick r:id="rId2"/>
-              </a:rPr>
-              <a:t>https://www.nic.cz</a:t>
-            </a:r>
-            <a:r>
-              <a:rPr lang="cs-CZ" sz="2800" b="0" strike="noStrike" spc="-1" dirty="0" smtClean="0">
-                <a:solidFill>
-                  <a:srgbClr val="000000"/>
-                </a:solidFill>
-                <a:uFill>
-                  <a:solidFill>
-                    <a:srgbClr val="FFFFFF"/>
-                  </a:solidFill>
-                </a:uFill>
-                <a:latin typeface="Calibri"/>
-              </a:rPr>
-              <a:t>, </a:t>
-            </a:r>
-            <a:r>
-              <a:rPr lang="cs-CZ" sz="2800" b="0" strike="noStrike" spc="-1" dirty="0" smtClean="0">
-                <a:solidFill>
-                  <a:srgbClr val="000000"/>
-                </a:solidFill>
-                <a:uFill>
-                  <a:solidFill>
-                    <a:srgbClr val="FFFFFF"/>
-                  </a:solidFill>
-                </a:uFill>
-                <a:latin typeface="Calibri"/>
-                <a:hlinkClick r:id="rId3"/>
-              </a:rPr>
-              <a:t>https://edushield.cz</a:t>
-            </a:r>
-            <a:r>
-              <a:rPr lang="cs-CZ" sz="2800" b="0" strike="noStrike" spc="-1" dirty="0" smtClean="0">
-                <a:solidFill>
-                  <a:srgbClr val="000000"/>
-                </a:solidFill>
-                <a:uFill>
-                  <a:solidFill>
-                    <a:srgbClr val="FFFFFF"/>
-                  </a:solidFill>
-                </a:uFill>
-                <a:latin typeface="Calibri"/>
-              </a:rPr>
-              <a:t> </a:t>
-            </a:r>
-            <a:endParaRPr lang="cs-CZ" sz="2800" b="0" strike="noStrike" spc="-1" dirty="0">
-              <a:solidFill>
-                <a:srgbClr val="000000"/>
-              </a:solidFill>
-              <a:uFill>
-                <a:solidFill>
-                  <a:srgbClr val="FFFFFF"/>
-                </a:solidFill>
-              </a:uFill>
-              <a:latin typeface="Calibri"/>
-            </a:endParaRPr>
-          </a:p>
-          <a:p>
-            <a:pPr marL="360">
-              <a:lnSpc>
-                <a:spcPct val="90000"/>
-              </a:lnSpc>
-              <a:buClr>
-                <a:srgbClr val="000000"/>
-              </a:buClr>
-            </a:pPr>
-            <a:endParaRPr lang="cs-CZ" sz="2800" b="0" strike="noStrike" spc="-1" dirty="0">
-              <a:solidFill>
-                <a:srgbClr val="000000"/>
-              </a:solidFill>
-              <a:uFill>
-                <a:solidFill>
-                  <a:srgbClr val="FFFFFF"/>
-                </a:solidFill>
-              </a:uFill>
-              <a:latin typeface="Calibri"/>
-            </a:endParaRPr>
-          </a:p>
-          <a:p>
-            <a:pPr marL="228600" indent="-228240">
-              <a:lnSpc>
-                <a:spcPct val="90000"/>
-              </a:lnSpc>
-              <a:buClr>
-                <a:srgbClr val="000000"/>
-              </a:buClr>
-              <a:buFont typeface="Arial"/>
-              <a:buChar char="•"/>
-            </a:pPr>
-            <a:r>
-              <a:rPr lang="cs-CZ" sz="2800" b="0" strike="noStrike" spc="-1" dirty="0">
-                <a:solidFill>
-                  <a:srgbClr val="000000"/>
-                </a:solidFill>
-                <a:uFill>
-                  <a:solidFill>
-                    <a:srgbClr val="FFFFFF"/>
-                  </a:solidFill>
-                </a:uFill>
-                <a:latin typeface="Calibri"/>
-              </a:rPr>
-              <a:t>Objednávejte na </a:t>
-            </a:r>
-            <a:r>
-              <a:rPr lang="cs-CZ" sz="2800" b="1" strike="noStrike" spc="-1" dirty="0">
-                <a:solidFill>
-                  <a:srgbClr val="000000"/>
-                </a:solidFill>
-                <a:uFill>
-                  <a:solidFill>
-                    <a:srgbClr val="FFFFFF"/>
-                  </a:solidFill>
-                </a:uFill>
-                <a:latin typeface="Calibri"/>
-                <a:hlinkClick r:id="rId4"/>
-              </a:rPr>
-              <a:t>akademie@nic.cz</a:t>
-            </a:r>
-            <a:endParaRPr lang="cs-CZ" sz="2800" b="0" strike="noStrike" spc="-1" dirty="0">
-              <a:solidFill>
-                <a:srgbClr val="000000"/>
-              </a:solidFill>
-              <a:uFill>
-                <a:solidFill>
-                  <a:srgbClr val="FFFFFF"/>
-                </a:solidFill>
-              </a:uFill>
-              <a:latin typeface="Calibri"/>
-            </a:endParaRPr>
-          </a:p>
-          <a:p>
-            <a:pPr marL="360">
-              <a:lnSpc>
-                <a:spcPct val="90000"/>
-              </a:lnSpc>
-              <a:buClr>
-                <a:srgbClr val="000000"/>
-              </a:buClr>
-            </a:pPr>
-            <a:r>
-              <a:rPr lang="cs-CZ" sz="2800" b="0" strike="noStrike" spc="-1" dirty="0">
-                <a:solidFill>
-                  <a:srgbClr val="000000"/>
-                </a:solidFill>
-                <a:uFill>
-                  <a:solidFill>
-                    <a:srgbClr val="FFFFFF"/>
-                  </a:solidFill>
-                </a:uFill>
-                <a:latin typeface="Calibri"/>
-              </a:rPr>
-              <a:t> </a:t>
-            </a:r>
-          </a:p>
-          <a:p>
-            <a:pPr marL="228600" indent="-228240">
-              <a:lnSpc>
-                <a:spcPct val="90000"/>
-              </a:lnSpc>
-              <a:buClr>
-                <a:srgbClr val="000000"/>
-              </a:buClr>
-              <a:buFont typeface="Arial"/>
-              <a:buChar char="•"/>
-            </a:pPr>
-            <a:r>
-              <a:rPr lang="cs-CZ" sz="2800" b="0" strike="noStrike" spc="-1" dirty="0">
-                <a:solidFill>
-                  <a:srgbClr val="000000"/>
-                </a:solidFill>
-                <a:uFill>
-                  <a:solidFill>
-                    <a:srgbClr val="FFFFFF"/>
-                  </a:solidFill>
-                </a:uFill>
-                <a:latin typeface="Calibri"/>
-              </a:rPr>
-              <a:t>Cena pro školy a další vzdělávací instituce / </a:t>
-            </a:r>
-            <a:r>
-              <a:rPr lang="cs-CZ" sz="2800" b="0" strike="noStrike" spc="-1" dirty="0" smtClean="0">
-                <a:solidFill>
-                  <a:srgbClr val="000000"/>
-                </a:solidFill>
-                <a:uFill>
-                  <a:solidFill>
-                    <a:srgbClr val="FFFFFF"/>
-                  </a:solidFill>
-                </a:uFill>
-                <a:latin typeface="Calibri"/>
-              </a:rPr>
-              <a:t>pracovníky:</a:t>
-            </a:r>
-            <a:br>
-              <a:rPr lang="cs-CZ" sz="2800" b="0" strike="noStrike" spc="-1" dirty="0" smtClean="0">
-                <a:solidFill>
-                  <a:srgbClr val="000000"/>
-                </a:solidFill>
-                <a:uFill>
-                  <a:solidFill>
-                    <a:srgbClr val="FFFFFF"/>
-                  </a:solidFill>
-                </a:uFill>
-                <a:latin typeface="Calibri"/>
-              </a:rPr>
-            </a:br>
-            <a:r>
-              <a:rPr lang="cs-CZ" sz="2800" b="1" strike="noStrike" spc="-1" dirty="0" smtClean="0">
-                <a:solidFill>
-                  <a:srgbClr val="000000"/>
-                </a:solidFill>
-                <a:uFill>
-                  <a:solidFill>
-                    <a:srgbClr val="FFFFFF"/>
-                  </a:solidFill>
-                </a:uFill>
-                <a:latin typeface="Calibri"/>
-              </a:rPr>
-              <a:t>250 </a:t>
-            </a:r>
-            <a:r>
-              <a:rPr lang="cs-CZ" sz="2800" b="1" strike="noStrike" spc="-1" dirty="0">
-                <a:solidFill>
-                  <a:srgbClr val="000000"/>
-                </a:solidFill>
-                <a:uFill>
-                  <a:solidFill>
-                    <a:srgbClr val="FFFFFF"/>
-                  </a:solidFill>
-                </a:uFill>
-                <a:latin typeface="Calibri"/>
-              </a:rPr>
-              <a:t>Kč / ks + DPH + poštovné a balné (99 Kč)</a:t>
-            </a:r>
-            <a:endParaRPr lang="cs-CZ" sz="2800" b="0" strike="noStrike" spc="-1" dirty="0">
-              <a:solidFill>
-                <a:srgbClr val="000000"/>
-              </a:solidFill>
-              <a:uFill>
-                <a:solidFill>
-                  <a:srgbClr val="FFFFFF"/>
-                </a:solidFill>
-              </a:uFill>
-              <a:latin typeface="Calibri"/>
-            </a:endParaRPr>
-          </a:p>
-          <a:p>
-            <a:pPr marL="360">
-              <a:lnSpc>
-                <a:spcPct val="90000"/>
-              </a:lnSpc>
-              <a:buClr>
-                <a:srgbClr val="000000"/>
-              </a:buClr>
-            </a:pPr>
-            <a:endParaRPr lang="cs-CZ" sz="2800" b="0" strike="noStrike" spc="-1" dirty="0">
-              <a:solidFill>
-                <a:srgbClr val="000000"/>
-              </a:solidFill>
-              <a:uFill>
-                <a:solidFill>
-                  <a:srgbClr val="FFFFFF"/>
-                </a:solidFill>
-              </a:uFill>
-              <a:latin typeface="Calibri"/>
-            </a:endParaRPr>
-          </a:p>
-          <a:p>
-            <a:pPr marL="228600" indent="-228240">
-              <a:lnSpc>
-                <a:spcPct val="90000"/>
-              </a:lnSpc>
-              <a:buClr>
-                <a:srgbClr val="000000"/>
-              </a:buClr>
-              <a:buFont typeface="Arial"/>
-              <a:buChar char="•"/>
-            </a:pPr>
-            <a:r>
-              <a:rPr lang="cs-CZ" sz="2800" b="0" strike="noStrike" spc="-1" dirty="0">
-                <a:solidFill>
-                  <a:srgbClr val="000000"/>
-                </a:solidFill>
-                <a:uFill>
-                  <a:solidFill>
-                    <a:srgbClr val="FFFFFF"/>
-                  </a:solidFill>
-                </a:uFill>
-                <a:latin typeface="Calibri"/>
-              </a:rPr>
-              <a:t>Komerční prodej v </a:t>
-            </a:r>
-            <a:r>
-              <a:rPr lang="cs-CZ" sz="2800" b="0" strike="noStrike" spc="-1" dirty="0" smtClean="0">
-                <a:solidFill>
-                  <a:srgbClr val="000000"/>
-                </a:solidFill>
-                <a:uFill>
-                  <a:solidFill>
-                    <a:srgbClr val="FFFFFF"/>
-                  </a:solidFill>
-                </a:uFill>
-                <a:latin typeface="Calibri"/>
-              </a:rPr>
-              <a:t>přípravě</a:t>
-            </a:r>
-            <a:endParaRPr lang="cs-CZ" sz="2800" b="0" strike="noStrike" spc="-1" dirty="0">
-              <a:solidFill>
-                <a:srgbClr val="000000"/>
-              </a:solidFill>
-              <a:uFill>
-                <a:solidFill>
-                  <a:srgbClr val="FFFFFF"/>
-                </a:solidFill>
-              </a:uFill>
-              <a:latin typeface="Calibri"/>
-            </a:endParaRPr>
-          </a:p>
-        </p:txBody>
-      </p:sp>
-    </p:spTree>
-    <p:extLst>
-      <p:ext uri="{BB962C8B-B14F-4D97-AF65-F5344CB8AC3E}">
-        <p14:creationId xmlns:p14="http://schemas.microsoft.com/office/powerpoint/2010/main" val="341151157"/>
       </p:ext>
     </p:extLst>
   </p:cSld>

</xml_diff>